<commit_message>
money transaction functionality added
</commit_message>
<xml_diff>
--- a/BankingSystemAppUI.pptx
+++ b/BankingSystemAppUI.pptx
@@ -104,6 +104,11 @@
       </a:defRPr>
     </a:lvl9pPr>
   </p:defaultTextStyle>
+  <p:extLst>
+    <p:ext uri="{EFAFB233-063F-42B5-8137-9DF3F51BA10A}">
+      <p15:sldGuideLst xmlns:p15="http://schemas.microsoft.com/office/powerpoint/2012/main"/>
+    </p:ext>
+  </p:extLst>
 </p:presentation>
 </file>
 
@@ -3410,8 +3415,8 @@
         </p:nvSpPr>
         <p:spPr>
           <a:xfrm>
-            <a:off x="1353670" y="466164"/>
-            <a:ext cx="2501153" cy="5925670"/>
+            <a:off x="1353671" y="466164"/>
+            <a:ext cx="2232810" cy="5925670"/>
           </a:xfrm>
           <a:prstGeom prst="roundRect">
             <a:avLst>
@@ -3446,7 +3451,7 @@
           <a:lstStyle/>
           <a:p>
             <a:pPr algn="ctr"/>
-            <a:endParaRPr lang="en-IN"/>
+            <a:endParaRPr lang="en-IN" dirty="0"/>
           </a:p>
         </p:txBody>
       </p:sp>
@@ -3464,8 +3469,8 @@
         </p:nvSpPr>
         <p:spPr>
           <a:xfrm>
-            <a:off x="3998258" y="1524000"/>
-            <a:ext cx="6840071" cy="4867834"/>
+            <a:off x="3729917" y="1524000"/>
+            <a:ext cx="7108412" cy="4867834"/>
           </a:xfrm>
           <a:prstGeom prst="roundRect">
             <a:avLst>
@@ -3518,8 +3523,8 @@
         </p:nvSpPr>
         <p:spPr>
           <a:xfrm>
-            <a:off x="8462684" y="466164"/>
-            <a:ext cx="2375645" cy="936812"/>
+            <a:off x="8722658" y="466164"/>
+            <a:ext cx="2115671" cy="936812"/>
           </a:xfrm>
           <a:prstGeom prst="roundRect">
             <a:avLst>
@@ -3550,20 +3555,37 @@
           </a:fontRef>
         </p:style>
         <p:txBody>
-          <a:bodyPr rtlCol="0" anchor="ctr"/>
-          <a:lstStyle/>
-          <a:p>
-            <a:pPr algn="ctr"/>
-            <a:endParaRPr lang="en-IN"/>
-          </a:p>
-        </p:txBody>
-      </p:sp>
-      <p:sp>
-        <p:nvSpPr>
-          <p:cNvPr id="10" name="Rectangle: Rounded Corners 9">
-            <a:extLst>
-              <a:ext uri="{FF2B5EF4-FFF2-40B4-BE49-F238E27FC236}">
-                <a16:creationId xmlns:a16="http://schemas.microsoft.com/office/drawing/2014/main" id="{76E3168F-345B-4721-A598-968CFA8D4651}"/>
+          <a:bodyPr rtlCol="0" anchor="t"/>
+          <a:lstStyle/>
+          <a:p>
+            <a:pPr algn="r"/>
+            <a:r>
+              <a:rPr lang="en-IN" dirty="0">
+                <a:solidFill>
+                  <a:schemeClr val="bg2">
+                    <a:lumMod val="50000"/>
+                  </a:schemeClr>
+                </a:solidFill>
+              </a:rPr>
+              <a:t>Bal.: </a:t>
+            </a:r>
+            <a:r>
+              <a:rPr lang="en-IN" sz="2400" dirty="0">
+                <a:solidFill>
+                  <a:srgbClr val="00B050"/>
+                </a:solidFill>
+              </a:rPr>
+              <a:t>1225.64</a:t>
+            </a:r>
+          </a:p>
+        </p:txBody>
+      </p:sp>
+      <p:sp>
+        <p:nvSpPr>
+          <p:cNvPr id="18" name="Oval 17">
+            <a:extLst>
+              <a:ext uri="{FF2B5EF4-FFF2-40B4-BE49-F238E27FC236}">
+                <a16:creationId xmlns:a16="http://schemas.microsoft.com/office/drawing/2014/main" id="{A14E8488-FC15-46BE-80D0-66ECEEE70C1E}"/>
               </a:ext>
             </a:extLst>
           </p:cNvPr>
@@ -3572,8 +3594,99 @@
         </p:nvSpPr>
         <p:spPr>
           <a:xfrm>
-            <a:off x="2079812" y="2234445"/>
-            <a:ext cx="1479176" cy="340663"/>
+            <a:off x="1525369" y="631174"/>
+            <a:ext cx="625968" cy="598753"/>
+          </a:xfrm>
+          <a:prstGeom prst="ellipse">
+            <a:avLst/>
+          </a:prstGeom>
+          <a:solidFill>
+            <a:schemeClr val="bg2"/>
+          </a:solidFill>
+          <a:ln>
+            <a:noFill/>
+          </a:ln>
+        </p:spPr>
+        <p:style>
+          <a:lnRef idx="2">
+            <a:schemeClr val="accent1">
+              <a:shade val="50000"/>
+            </a:schemeClr>
+          </a:lnRef>
+          <a:fillRef idx="1">
+            <a:schemeClr val="accent1"/>
+          </a:fillRef>
+          <a:effectRef idx="0">
+            <a:schemeClr val="accent1"/>
+          </a:effectRef>
+          <a:fontRef idx="minor">
+            <a:schemeClr val="lt1"/>
+          </a:fontRef>
+        </p:style>
+        <p:txBody>
+          <a:bodyPr rtlCol="0" anchor="ctr"/>
+          <a:lstStyle/>
+          <a:p>
+            <a:pPr algn="ctr"/>
+            <a:endParaRPr lang="en-IN"/>
+          </a:p>
+        </p:txBody>
+      </p:sp>
+      <p:pic>
+        <p:nvPicPr>
+          <p:cNvPr id="20" name="Graphic 19" descr="User with solid fill">
+            <a:extLst>
+              <a:ext uri="{FF2B5EF4-FFF2-40B4-BE49-F238E27FC236}">
+                <a16:creationId xmlns:a16="http://schemas.microsoft.com/office/drawing/2014/main" id="{80DE66BE-7465-4C61-BEC3-8BAD6F1EAA3A}"/>
+              </a:ext>
+            </a:extLst>
+          </p:cNvPr>
+          <p:cNvPicPr>
+            <a:picLocks noChangeAspect="1"/>
+          </p:cNvPicPr>
+          <p:nvPr/>
+        </p:nvPicPr>
+        <p:blipFill>
+          <a:blip r:embed="rId2">
+            <a:extLst>
+              <a:ext uri="{28A0092B-C50C-407E-A947-70E740481C1C}">
+                <a14:useLocalDpi xmlns:a14="http://schemas.microsoft.com/office/drawing/2010/main" val="0"/>
+              </a:ext>
+              <a:ext uri="{96DAC541-7B7A-43D3-8B79-37D633B846F1}">
+                <asvg:svgBlip xmlns:asvg="http://schemas.microsoft.com/office/drawing/2016/SVG/main" r:embed="rId3"/>
+              </a:ext>
+            </a:extLst>
+          </a:blip>
+          <a:stretch>
+            <a:fillRect/>
+          </a:stretch>
+        </p:blipFill>
+        <p:spPr>
+          <a:xfrm>
+            <a:off x="1586773" y="673863"/>
+            <a:ext cx="503159" cy="503159"/>
+          </a:xfrm>
+          <a:prstGeom prst="rect">
+            <a:avLst/>
+          </a:prstGeom>
+        </p:spPr>
+      </p:pic>
+      <p:sp>
+        <p:nvSpPr>
+          <p:cNvPr id="21" name="Rectangle: Rounded Corners 20">
+            <a:extLst>
+              <a:ext uri="{FF2B5EF4-FFF2-40B4-BE49-F238E27FC236}">
+                <a16:creationId xmlns:a16="http://schemas.microsoft.com/office/drawing/2014/main" id="{409932E2-36B3-48AB-98E7-CDEE5AD4D22B}"/>
+              </a:ext>
+            </a:extLst>
+          </p:cNvPr>
+          <p:cNvSpPr/>
+          <p:nvPr/>
+        </p:nvSpPr>
+        <p:spPr>
+          <a:xfrm>
+            <a:off x="1528929" y="1716284"/>
+            <a:ext cx="1104476" cy="340663"/>
           </a:xfrm>
           <a:prstGeom prst="roundRect">
             <a:avLst>
@@ -3609,26 +3722,23 @@
           <a:bodyPr rtlCol="0" anchor="ctr"/>
           <a:lstStyle/>
           <a:p>
-            <a:r>
-              <a:rPr lang="en-IN" dirty="0">
-                <a:solidFill>
-                  <a:schemeClr val="tx1">
-                    <a:lumMod val="65000"/>
-                    <a:lumOff val="35000"/>
-                  </a:schemeClr>
-                </a:solidFill>
-              </a:rPr>
-              <a:t>Home</a:t>
-            </a:r>
-          </a:p>
-        </p:txBody>
-      </p:sp>
-      <p:sp>
-        <p:nvSpPr>
-          <p:cNvPr id="13" name="Rectangle: Rounded Corners 12">
-            <a:extLst>
-              <a:ext uri="{FF2B5EF4-FFF2-40B4-BE49-F238E27FC236}">
-                <a16:creationId xmlns:a16="http://schemas.microsoft.com/office/drawing/2014/main" id="{3939F396-BDAB-4E0A-9AC5-7ADE50E9CD28}"/>
+            <a:endParaRPr lang="en-IN" dirty="0">
+              <a:solidFill>
+                <a:schemeClr val="tx1">
+                  <a:lumMod val="65000"/>
+                  <a:lumOff val="35000"/>
+                </a:schemeClr>
+              </a:solidFill>
+            </a:endParaRPr>
+          </a:p>
+        </p:txBody>
+      </p:sp>
+      <p:sp>
+        <p:nvSpPr>
+          <p:cNvPr id="10" name="Rectangle: Rounded Corners 9">
+            <a:extLst>
+              <a:ext uri="{FF2B5EF4-FFF2-40B4-BE49-F238E27FC236}">
+                <a16:creationId xmlns:a16="http://schemas.microsoft.com/office/drawing/2014/main" id="{76E3168F-345B-4721-A598-968CFA8D4651}"/>
               </a:ext>
             </a:extLst>
           </p:cNvPr>
@@ -3637,8 +3747,8 @@
         </p:nvSpPr>
         <p:spPr>
           <a:xfrm>
-            <a:off x="2079812" y="2746556"/>
-            <a:ext cx="1479176" cy="340663"/>
+            <a:off x="1851235" y="1717799"/>
+            <a:ext cx="1418662" cy="340663"/>
           </a:xfrm>
           <a:prstGeom prst="roundRect">
             <a:avLst>
@@ -3683,17 +3793,56 @@
                   </a:schemeClr>
                 </a:solidFill>
               </a:rPr>
-              <a:t>Profile</a:t>
-            </a:r>
-          </a:p>
-        </p:txBody>
-      </p:sp>
-      <p:sp>
-        <p:nvSpPr>
-          <p:cNvPr id="17" name="Rectangle: Rounded Corners 16">
-            <a:extLst>
-              <a:ext uri="{FF2B5EF4-FFF2-40B4-BE49-F238E27FC236}">
-                <a16:creationId xmlns:a16="http://schemas.microsoft.com/office/drawing/2014/main" id="{BDE65389-F8F8-4974-8CC2-03C26E0990C0}"/>
+              <a:t>Home</a:t>
+            </a:r>
+          </a:p>
+        </p:txBody>
+      </p:sp>
+      <p:pic>
+        <p:nvPicPr>
+          <p:cNvPr id="12" name="Graphic 11" descr="Home with solid fill">
+            <a:extLst>
+              <a:ext uri="{FF2B5EF4-FFF2-40B4-BE49-F238E27FC236}">
+                <a16:creationId xmlns:a16="http://schemas.microsoft.com/office/drawing/2014/main" id="{2EC214DB-C8B8-4F68-8C95-339471970D63}"/>
+              </a:ext>
+            </a:extLst>
+          </p:cNvPr>
+          <p:cNvPicPr>
+            <a:picLocks noChangeAspect="1"/>
+          </p:cNvPicPr>
+          <p:nvPr/>
+        </p:nvPicPr>
+        <p:blipFill>
+          <a:blip r:embed="rId4">
+            <a:extLst>
+              <a:ext uri="{28A0092B-C50C-407E-A947-70E740481C1C}">
+                <a14:useLocalDpi xmlns:a14="http://schemas.microsoft.com/office/drawing/2010/main" val="0"/>
+              </a:ext>
+              <a:ext uri="{96DAC541-7B7A-43D3-8B79-37D633B846F1}">
+                <asvg:svgBlip xmlns:asvg="http://schemas.microsoft.com/office/drawing/2016/SVG/main" r:embed="rId5"/>
+              </a:ext>
+            </a:extLst>
+          </a:blip>
+          <a:stretch>
+            <a:fillRect/>
+          </a:stretch>
+        </p:blipFill>
+        <p:spPr>
+          <a:xfrm>
+            <a:off x="1586774" y="1750251"/>
+            <a:ext cx="264463" cy="264463"/>
+          </a:xfrm>
+          <a:prstGeom prst="rect">
+            <a:avLst/>
+          </a:prstGeom>
+        </p:spPr>
+      </p:pic>
+      <p:sp>
+        <p:nvSpPr>
+          <p:cNvPr id="23" name="Rectangle: Rounded Corners 22">
+            <a:extLst>
+              <a:ext uri="{FF2B5EF4-FFF2-40B4-BE49-F238E27FC236}">
+                <a16:creationId xmlns:a16="http://schemas.microsoft.com/office/drawing/2014/main" id="{32A129E2-AF10-4B38-B5DD-612383359D9A}"/>
               </a:ext>
             </a:extLst>
           </p:cNvPr>
@@ -3702,8 +3851,8 @@
         </p:nvSpPr>
         <p:spPr>
           <a:xfrm>
-            <a:off x="2079812" y="3258668"/>
-            <a:ext cx="1479176" cy="340663"/>
+            <a:off x="1549263" y="2223524"/>
+            <a:ext cx="1084142" cy="340663"/>
           </a:xfrm>
           <a:prstGeom prst="roundRect">
             <a:avLst>
@@ -3739,26 +3888,62 @@
           <a:bodyPr rtlCol="0" anchor="ctr"/>
           <a:lstStyle/>
           <a:p>
-            <a:r>
-              <a:rPr lang="en-IN" dirty="0">
-                <a:solidFill>
-                  <a:schemeClr val="tx1">
-                    <a:lumMod val="65000"/>
-                    <a:lumOff val="35000"/>
-                  </a:schemeClr>
-                </a:solidFill>
-              </a:rPr>
-              <a:t>Transaction</a:t>
-            </a:r>
-          </a:p>
-        </p:txBody>
-      </p:sp>
-      <p:sp>
-        <p:nvSpPr>
-          <p:cNvPr id="19" name="Rectangle: Rounded Corners 18">
-            <a:extLst>
-              <a:ext uri="{FF2B5EF4-FFF2-40B4-BE49-F238E27FC236}">
-                <a16:creationId xmlns:a16="http://schemas.microsoft.com/office/drawing/2014/main" id="{2193C1B5-3264-4F49-8166-37AD13B99C07}"/>
+            <a:endParaRPr lang="en-IN" dirty="0">
+              <a:solidFill>
+                <a:schemeClr val="tx1">
+                  <a:lumMod val="65000"/>
+                  <a:lumOff val="35000"/>
+                </a:schemeClr>
+              </a:solidFill>
+            </a:endParaRPr>
+          </a:p>
+        </p:txBody>
+      </p:sp>
+      <p:pic>
+        <p:nvPicPr>
+          <p:cNvPr id="22" name="Graphic 21" descr="User with solid fill">
+            <a:extLst>
+              <a:ext uri="{FF2B5EF4-FFF2-40B4-BE49-F238E27FC236}">
+                <a16:creationId xmlns:a16="http://schemas.microsoft.com/office/drawing/2014/main" id="{4504607F-C251-431B-A809-0AC01FB3C3B6}"/>
+              </a:ext>
+            </a:extLst>
+          </p:cNvPr>
+          <p:cNvPicPr>
+            <a:picLocks noChangeAspect="1"/>
+          </p:cNvPicPr>
+          <p:nvPr/>
+        </p:nvPicPr>
+        <p:blipFill>
+          <a:blip r:embed="rId2">
+            <a:extLst>
+              <a:ext uri="{28A0092B-C50C-407E-A947-70E740481C1C}">
+                <a14:useLocalDpi xmlns:a14="http://schemas.microsoft.com/office/drawing/2010/main" val="0"/>
+              </a:ext>
+              <a:ext uri="{96DAC541-7B7A-43D3-8B79-37D633B846F1}">
+                <asvg:svgBlip xmlns:asvg="http://schemas.microsoft.com/office/drawing/2016/SVG/main" r:embed="rId3"/>
+              </a:ext>
+            </a:extLst>
+          </a:blip>
+          <a:stretch>
+            <a:fillRect/>
+          </a:stretch>
+        </p:blipFill>
+        <p:spPr>
+          <a:xfrm>
+            <a:off x="1586773" y="2235391"/>
+            <a:ext cx="264463" cy="264463"/>
+          </a:xfrm>
+          <a:prstGeom prst="rect">
+            <a:avLst/>
+          </a:prstGeom>
+        </p:spPr>
+      </p:pic>
+      <p:sp>
+        <p:nvSpPr>
+          <p:cNvPr id="13" name="Rectangle: Rounded Corners 12">
+            <a:extLst>
+              <a:ext uri="{FF2B5EF4-FFF2-40B4-BE49-F238E27FC236}">
+                <a16:creationId xmlns:a16="http://schemas.microsoft.com/office/drawing/2014/main" id="{3939F396-BDAB-4E0A-9AC5-7ADE50E9CD28}"/>
               </a:ext>
             </a:extLst>
           </p:cNvPr>
@@ -3767,8 +3952,8 @@
         </p:nvSpPr>
         <p:spPr>
           <a:xfrm>
-            <a:off x="2079812" y="3771895"/>
-            <a:ext cx="1479176" cy="340663"/>
+            <a:off x="1851235" y="2222009"/>
+            <a:ext cx="1418663" cy="340663"/>
           </a:xfrm>
           <a:prstGeom prst="roundRect">
             <a:avLst>
@@ -3813,17 +3998,17 @@
                   </a:schemeClr>
                 </a:solidFill>
               </a:rPr>
-              <a:t>Stocks</a:t>
-            </a:r>
-          </a:p>
-        </p:txBody>
-      </p:sp>
-      <p:sp>
-        <p:nvSpPr>
-          <p:cNvPr id="31" name="Oval 30">
-            <a:extLst>
-              <a:ext uri="{FF2B5EF4-FFF2-40B4-BE49-F238E27FC236}">
-                <a16:creationId xmlns:a16="http://schemas.microsoft.com/office/drawing/2014/main" id="{5B3B5FDE-1043-4E13-80B2-A101F89FC51E}"/>
+              <a:t>Profile</a:t>
+            </a:r>
+          </a:p>
+        </p:txBody>
+      </p:sp>
+      <p:sp>
+        <p:nvSpPr>
+          <p:cNvPr id="25" name="Rectangle: Rounded Corners 24">
+            <a:extLst>
+              <a:ext uri="{FF2B5EF4-FFF2-40B4-BE49-F238E27FC236}">
+                <a16:creationId xmlns:a16="http://schemas.microsoft.com/office/drawing/2014/main" id="{A912B05B-E0E3-4EBB-9B70-4FB398701B42}"/>
               </a:ext>
             </a:extLst>
           </p:cNvPr>
@@ -3832,14 +4017,18 @@
         </p:nvSpPr>
         <p:spPr>
           <a:xfrm>
-            <a:off x="1596525" y="2190743"/>
-            <a:ext cx="445497" cy="426128"/>
+            <a:off x="1549263" y="2742023"/>
+            <a:ext cx="1084142" cy="340663"/>
           </a:xfrm>
-          <a:prstGeom prst="ellipse">
-            <a:avLst/>
+          <a:prstGeom prst="roundRect">
+            <a:avLst>
+              <a:gd name="adj" fmla="val 16264"/>
+            </a:avLst>
           </a:prstGeom>
           <a:solidFill>
-            <a:schemeClr val="bg2"/>
+            <a:schemeClr val="bg1">
+              <a:lumMod val="95000"/>
+            </a:schemeClr>
           </a:solidFill>
           <a:ln>
             <a:noFill/>
@@ -3865,72 +4054,43 @@
           <a:bodyPr rtlCol="0" anchor="ctr"/>
           <a:lstStyle/>
           <a:p>
-            <a:pPr algn="ctr"/>
-            <a:endParaRPr lang="en-IN"/>
-          </a:p>
-        </p:txBody>
-      </p:sp>
-      <p:pic>
-        <p:nvPicPr>
-          <p:cNvPr id="12" name="Graphic 11" descr="Home with solid fill">
-            <a:extLst>
-              <a:ext uri="{FF2B5EF4-FFF2-40B4-BE49-F238E27FC236}">
-                <a16:creationId xmlns:a16="http://schemas.microsoft.com/office/drawing/2014/main" id="{2EC214DB-C8B8-4F68-8C95-339471970D63}"/>
-              </a:ext>
-            </a:extLst>
-          </p:cNvPr>
-          <p:cNvPicPr>
-            <a:picLocks noChangeAspect="1"/>
-          </p:cNvPicPr>
+            <a:endParaRPr lang="en-IN" dirty="0">
+              <a:solidFill>
+                <a:schemeClr val="tx1">
+                  <a:lumMod val="65000"/>
+                  <a:lumOff val="35000"/>
+                </a:schemeClr>
+              </a:solidFill>
+            </a:endParaRPr>
+          </a:p>
+        </p:txBody>
+      </p:sp>
+      <p:sp>
+        <p:nvSpPr>
+          <p:cNvPr id="17" name="Rectangle: Rounded Corners 16">
+            <a:extLst>
+              <a:ext uri="{FF2B5EF4-FFF2-40B4-BE49-F238E27FC236}">
+                <a16:creationId xmlns:a16="http://schemas.microsoft.com/office/drawing/2014/main" id="{BDE65389-F8F8-4974-8CC2-03C26E0990C0}"/>
+              </a:ext>
+            </a:extLst>
+          </p:cNvPr>
+          <p:cNvSpPr/>
           <p:nvPr/>
-        </p:nvPicPr>
-        <p:blipFill>
-          <a:blip r:embed="rId2">
-            <a:extLst>
-              <a:ext uri="{28A0092B-C50C-407E-A947-70E740481C1C}">
-                <a14:useLocalDpi xmlns:a14="http://schemas.microsoft.com/office/drawing/2010/main" val="0"/>
-              </a:ext>
-              <a:ext uri="{96DAC541-7B7A-43D3-8B79-37D633B846F1}">
-                <asvg:svgBlip xmlns:asvg="http://schemas.microsoft.com/office/drawing/2016/SVG/main" r:embed="rId3"/>
-              </a:ext>
-            </a:extLst>
-          </a:blip>
-          <a:stretch>
-            <a:fillRect/>
-          </a:stretch>
-        </p:blipFill>
+        </p:nvSpPr>
         <p:spPr>
           <a:xfrm>
-            <a:off x="1685787" y="2251213"/>
-            <a:ext cx="264463" cy="264463"/>
+            <a:off x="1862247" y="2740508"/>
+            <a:ext cx="1407652" cy="340663"/>
           </a:xfrm>
-          <a:prstGeom prst="rect">
-            <a:avLst/>
-          </a:prstGeom>
-        </p:spPr>
-      </p:pic>
-      <p:sp>
-        <p:nvSpPr>
-          <p:cNvPr id="32" name="Oval 31">
-            <a:extLst>
-              <a:ext uri="{FF2B5EF4-FFF2-40B4-BE49-F238E27FC236}">
-                <a16:creationId xmlns:a16="http://schemas.microsoft.com/office/drawing/2014/main" id="{085F0D1D-5C32-4FA9-9622-ACA890517FF3}"/>
-              </a:ext>
-            </a:extLst>
-          </p:cNvPr>
-          <p:cNvSpPr/>
-          <p:nvPr/>
-        </p:nvSpPr>
-        <p:spPr>
-          <a:xfrm>
-            <a:off x="1596525" y="2699418"/>
-            <a:ext cx="445497" cy="426128"/>
-          </a:xfrm>
-          <a:prstGeom prst="ellipse">
-            <a:avLst/>
+          <a:prstGeom prst="roundRect">
+            <a:avLst>
+              <a:gd name="adj" fmla="val 16264"/>
+            </a:avLst>
           </a:prstGeom>
           <a:solidFill>
-            <a:schemeClr val="bg2"/>
+            <a:schemeClr val="bg1">
+              <a:lumMod val="95000"/>
+            </a:schemeClr>
           </a:solidFill>
           <a:ln>
             <a:noFill/>
@@ -3956,17 +4116,26 @@
           <a:bodyPr rtlCol="0" anchor="ctr"/>
           <a:lstStyle/>
           <a:p>
-            <a:pPr algn="ctr"/>
-            <a:endParaRPr lang="en-IN"/>
+            <a:r>
+              <a:rPr lang="en-IN" dirty="0">
+                <a:solidFill>
+                  <a:schemeClr val="tx1">
+                    <a:lumMod val="65000"/>
+                    <a:lumOff val="35000"/>
+                  </a:schemeClr>
+                </a:solidFill>
+              </a:rPr>
+              <a:t>Transaction</a:t>
+            </a:r>
           </a:p>
         </p:txBody>
       </p:sp>
       <p:pic>
         <p:nvPicPr>
-          <p:cNvPr id="22" name="Graphic 21" descr="User with solid fill">
-            <a:extLst>
-              <a:ext uri="{FF2B5EF4-FFF2-40B4-BE49-F238E27FC236}">
-                <a16:creationId xmlns:a16="http://schemas.microsoft.com/office/drawing/2014/main" id="{4504607F-C251-431B-A809-0AC01FB3C3B6}"/>
+          <p:cNvPr id="24" name="Graphic 23" descr="Transfer with solid fill">
+            <a:extLst>
+              <a:ext uri="{FF2B5EF4-FFF2-40B4-BE49-F238E27FC236}">
+                <a16:creationId xmlns:a16="http://schemas.microsoft.com/office/drawing/2014/main" id="{5FB554FC-FBDC-4A2F-9737-18CD09DDFAC8}"/>
               </a:ext>
             </a:extLst>
           </p:cNvPr>
@@ -3976,13 +4145,13 @@
           <p:nvPr/>
         </p:nvPicPr>
         <p:blipFill>
-          <a:blip r:embed="rId4">
+          <a:blip r:embed="rId6">
             <a:extLst>
               <a:ext uri="{28A0092B-C50C-407E-A947-70E740481C1C}">
                 <a14:useLocalDpi xmlns:a14="http://schemas.microsoft.com/office/drawing/2010/main" val="0"/>
               </a:ext>
               <a:ext uri="{96DAC541-7B7A-43D3-8B79-37D633B846F1}">
-                <asvg:svgBlip xmlns:asvg="http://schemas.microsoft.com/office/drawing/2016/SVG/main" r:embed="rId5"/>
+                <asvg:svgBlip xmlns:asvg="http://schemas.microsoft.com/office/drawing/2016/SVG/main" r:embed="rId7"/>
               </a:ext>
             </a:extLst>
           </a:blip>
@@ -3991,9 +4160,9 @@
           </a:stretch>
         </p:blipFill>
         <p:spPr>
-          <a:xfrm>
-            <a:off x="1685787" y="2763321"/>
-            <a:ext cx="264463" cy="264463"/>
+          <a:xfrm flipH="1">
+            <a:off x="1586773" y="2796541"/>
+            <a:ext cx="264455" cy="264455"/>
           </a:xfrm>
           <a:prstGeom prst="rect">
             <a:avLst/>
@@ -4002,10 +4171,10 @@
       </p:pic>
       <p:sp>
         <p:nvSpPr>
-          <p:cNvPr id="33" name="Oval 32">
-            <a:extLst>
-              <a:ext uri="{FF2B5EF4-FFF2-40B4-BE49-F238E27FC236}">
-                <a16:creationId xmlns:a16="http://schemas.microsoft.com/office/drawing/2014/main" id="{1826CF66-37DB-4378-9BED-4122A810C018}"/>
+          <p:cNvPr id="27" name="Rectangle: Rounded Corners 26">
+            <a:extLst>
+              <a:ext uri="{FF2B5EF4-FFF2-40B4-BE49-F238E27FC236}">
+                <a16:creationId xmlns:a16="http://schemas.microsoft.com/office/drawing/2014/main" id="{8D207A7A-4559-4FE7-8C36-ED03A4A7F443}"/>
               </a:ext>
             </a:extLst>
           </p:cNvPr>
@@ -4014,14 +4183,18 @@
         </p:nvSpPr>
         <p:spPr>
           <a:xfrm>
-            <a:off x="1595275" y="3204719"/>
-            <a:ext cx="445497" cy="426128"/>
+            <a:off x="1549263" y="3249923"/>
+            <a:ext cx="1084142" cy="340663"/>
           </a:xfrm>
-          <a:prstGeom prst="ellipse">
-            <a:avLst/>
+          <a:prstGeom prst="roundRect">
+            <a:avLst>
+              <a:gd name="adj" fmla="val 16264"/>
+            </a:avLst>
           </a:prstGeom>
           <a:solidFill>
-            <a:schemeClr val="bg2"/>
+            <a:schemeClr val="bg1">
+              <a:lumMod val="95000"/>
+            </a:schemeClr>
           </a:solidFill>
           <a:ln>
             <a:noFill/>
@@ -4047,56 +4220,23 @@
           <a:bodyPr rtlCol="0" anchor="ctr"/>
           <a:lstStyle/>
           <a:p>
-            <a:pPr algn="ctr"/>
-            <a:endParaRPr lang="en-IN"/>
-          </a:p>
-        </p:txBody>
-      </p:sp>
-      <p:pic>
-        <p:nvPicPr>
-          <p:cNvPr id="24" name="Graphic 23" descr="Transfer with solid fill">
-            <a:extLst>
-              <a:ext uri="{FF2B5EF4-FFF2-40B4-BE49-F238E27FC236}">
-                <a16:creationId xmlns:a16="http://schemas.microsoft.com/office/drawing/2014/main" id="{5FB554FC-FBDC-4A2F-9737-18CD09DDFAC8}"/>
-              </a:ext>
-            </a:extLst>
-          </p:cNvPr>
-          <p:cNvPicPr>
-            <a:picLocks noChangeAspect="1"/>
-          </p:cNvPicPr>
-          <p:nvPr/>
-        </p:nvPicPr>
-        <p:blipFill>
-          <a:blip r:embed="rId6">
-            <a:extLst>
-              <a:ext uri="{28A0092B-C50C-407E-A947-70E740481C1C}">
-                <a14:useLocalDpi xmlns:a14="http://schemas.microsoft.com/office/drawing/2010/main" val="0"/>
-              </a:ext>
-              <a:ext uri="{96DAC541-7B7A-43D3-8B79-37D633B846F1}">
-                <asvg:svgBlip xmlns:asvg="http://schemas.microsoft.com/office/drawing/2016/SVG/main" r:embed="rId7"/>
-              </a:ext>
-            </a:extLst>
-          </a:blip>
-          <a:stretch>
-            <a:fillRect/>
-          </a:stretch>
-        </p:blipFill>
-        <p:spPr>
-          <a:xfrm flipH="1">
-            <a:off x="1685795" y="3296772"/>
-            <a:ext cx="264455" cy="264455"/>
-          </a:xfrm>
-          <a:prstGeom prst="rect">
-            <a:avLst/>
-          </a:prstGeom>
-        </p:spPr>
-      </p:pic>
-      <p:sp>
-        <p:nvSpPr>
-          <p:cNvPr id="34" name="Oval 33">
-            <a:extLst>
-              <a:ext uri="{FF2B5EF4-FFF2-40B4-BE49-F238E27FC236}">
-                <a16:creationId xmlns:a16="http://schemas.microsoft.com/office/drawing/2014/main" id="{CB08E0F1-54A8-4083-B04D-11EA2CD2ED88}"/>
+            <a:endParaRPr lang="en-IN" dirty="0">
+              <a:solidFill>
+                <a:schemeClr val="tx1">
+                  <a:lumMod val="65000"/>
+                  <a:lumOff val="35000"/>
+                </a:schemeClr>
+              </a:solidFill>
+            </a:endParaRPr>
+          </a:p>
+        </p:txBody>
+      </p:sp>
+      <p:sp>
+        <p:nvSpPr>
+          <p:cNvPr id="19" name="Rectangle: Rounded Corners 18">
+            <a:extLst>
+              <a:ext uri="{FF2B5EF4-FFF2-40B4-BE49-F238E27FC236}">
+                <a16:creationId xmlns:a16="http://schemas.microsoft.com/office/drawing/2014/main" id="{2193C1B5-3264-4F49-8166-37AD13B99C07}"/>
               </a:ext>
             </a:extLst>
           </p:cNvPr>
@@ -4105,14 +4245,18 @@
         </p:nvSpPr>
         <p:spPr>
           <a:xfrm>
-            <a:off x="1595275" y="3710020"/>
-            <a:ext cx="445497" cy="426128"/>
+            <a:off x="1862245" y="3253735"/>
+            <a:ext cx="1407653" cy="340663"/>
           </a:xfrm>
-          <a:prstGeom prst="ellipse">
-            <a:avLst/>
+          <a:prstGeom prst="roundRect">
+            <a:avLst>
+              <a:gd name="adj" fmla="val 16264"/>
+            </a:avLst>
           </a:prstGeom>
           <a:solidFill>
-            <a:schemeClr val="bg2"/>
+            <a:schemeClr val="bg1">
+              <a:lumMod val="95000"/>
+            </a:schemeClr>
           </a:solidFill>
           <a:ln>
             <a:noFill/>
@@ -4138,17 +4282,95 @@
           <a:bodyPr rtlCol="0" anchor="ctr"/>
           <a:lstStyle/>
           <a:p>
-            <a:pPr algn="ctr"/>
-            <a:endParaRPr lang="en-IN"/>
+            <a:r>
+              <a:rPr lang="en-IN" dirty="0">
+                <a:solidFill>
+                  <a:schemeClr val="tx1">
+                    <a:lumMod val="65000"/>
+                    <a:lumOff val="35000"/>
+                  </a:schemeClr>
+                </a:solidFill>
+              </a:rPr>
+              <a:t>Notifications</a:t>
+            </a:r>
+          </a:p>
+        </p:txBody>
+      </p:sp>
+      <p:sp>
+        <p:nvSpPr>
+          <p:cNvPr id="2" name="Rectangle 1">
+            <a:extLst>
+              <a:ext uri="{FF2B5EF4-FFF2-40B4-BE49-F238E27FC236}">
+                <a16:creationId xmlns:a16="http://schemas.microsoft.com/office/drawing/2014/main" id="{5D10647D-D5C6-4F8D-872D-90FF4F4BE7AF}"/>
+              </a:ext>
+            </a:extLst>
+          </p:cNvPr>
+          <p:cNvSpPr/>
+          <p:nvPr/>
+        </p:nvSpPr>
+        <p:spPr>
+          <a:xfrm>
+            <a:off x="2151334" y="673863"/>
+            <a:ext cx="1586947" cy="503159"/>
+          </a:xfrm>
+          <a:prstGeom prst="rect">
+            <a:avLst/>
+          </a:prstGeom>
+          <a:noFill/>
+          <a:ln>
+            <a:noFill/>
+          </a:ln>
+        </p:spPr>
+        <p:style>
+          <a:lnRef idx="2">
+            <a:schemeClr val="accent1">
+              <a:shade val="50000"/>
+            </a:schemeClr>
+          </a:lnRef>
+          <a:fillRef idx="1">
+            <a:schemeClr val="accent1"/>
+          </a:fillRef>
+          <a:effectRef idx="0">
+            <a:schemeClr val="accent1"/>
+          </a:effectRef>
+          <a:fontRef idx="minor">
+            <a:schemeClr val="lt1"/>
+          </a:fontRef>
+        </p:style>
+        <p:txBody>
+          <a:bodyPr rtlCol="0" anchor="ctr"/>
+          <a:lstStyle/>
+          <a:p>
+            <a:r>
+              <a:rPr lang="en-IN" sz="1600" dirty="0">
+                <a:solidFill>
+                  <a:srgbClr val="002060"/>
+                </a:solidFill>
+              </a:rPr>
+              <a:t>Bhanu Singh</a:t>
+            </a:r>
+          </a:p>
+          <a:p>
+            <a:r>
+              <a:rPr lang="en-IN" sz="1200" dirty="0">
+                <a:solidFill>
+                  <a:schemeClr val="tx1">
+                    <a:lumMod val="75000"/>
+                    <a:lumOff val="25000"/>
+                  </a:schemeClr>
+                </a:solidFill>
+              </a:rPr>
+              <a:t>bhanu@gmail.com</a:t>
+            </a:r>
           </a:p>
         </p:txBody>
       </p:sp>
       <p:pic>
         <p:nvPicPr>
-          <p:cNvPr id="26" name="Graphic 25" descr="Bar chart with solid fill">
-            <a:extLst>
-              <a:ext uri="{FF2B5EF4-FFF2-40B4-BE49-F238E27FC236}">
-                <a16:creationId xmlns:a16="http://schemas.microsoft.com/office/drawing/2014/main" id="{68C4A92F-8822-4B3F-8F16-05EF4DE19D89}"/>
+          <p:cNvPr id="8" name="Graphic 7" descr="Chat bubble with solid fill">
+            <a:extLst>
+              <a:ext uri="{FF2B5EF4-FFF2-40B4-BE49-F238E27FC236}">
+                <a16:creationId xmlns:a16="http://schemas.microsoft.com/office/drawing/2014/main" id="{36FB25C3-A56F-4D6F-BDBD-3BCC27BDEDF3}"/>
               </a:ext>
             </a:extLst>
           </p:cNvPr>
@@ -4174,8 +4396,365 @@
         </p:blipFill>
         <p:spPr>
           <a:xfrm>
-            <a:off x="1685792" y="3787528"/>
-            <a:ext cx="264463" cy="264463"/>
+            <a:off x="1560435" y="3288341"/>
+            <a:ext cx="300019" cy="300019"/>
+          </a:xfrm>
+          <a:prstGeom prst="rect">
+            <a:avLst/>
+          </a:prstGeom>
+        </p:spPr>
+      </p:pic>
+      <p:sp>
+        <p:nvSpPr>
+          <p:cNvPr id="9" name="Rectangle: Rounded Corners 8">
+            <a:extLst>
+              <a:ext uri="{FF2B5EF4-FFF2-40B4-BE49-F238E27FC236}">
+                <a16:creationId xmlns:a16="http://schemas.microsoft.com/office/drawing/2014/main" id="{3A61B83C-B9BE-4367-943C-37AF49FC25C7}"/>
+              </a:ext>
+            </a:extLst>
+          </p:cNvPr>
+          <p:cNvSpPr/>
+          <p:nvPr/>
+        </p:nvSpPr>
+        <p:spPr>
+          <a:xfrm>
+            <a:off x="8829440" y="1048264"/>
+            <a:ext cx="855296" cy="265421"/>
+          </a:xfrm>
+          <a:prstGeom prst="roundRect">
+            <a:avLst/>
+          </a:prstGeom>
+          <a:solidFill>
+            <a:schemeClr val="bg1">
+              <a:lumMod val="95000"/>
+            </a:schemeClr>
+          </a:solidFill>
+          <a:ln>
+            <a:noFill/>
+          </a:ln>
+        </p:spPr>
+        <p:style>
+          <a:lnRef idx="2">
+            <a:schemeClr val="accent1">
+              <a:shade val="50000"/>
+            </a:schemeClr>
+          </a:lnRef>
+          <a:fillRef idx="1">
+            <a:schemeClr val="accent1"/>
+          </a:fillRef>
+          <a:effectRef idx="0">
+            <a:schemeClr val="accent1"/>
+          </a:effectRef>
+          <a:fontRef idx="minor">
+            <a:schemeClr val="lt1"/>
+          </a:fontRef>
+        </p:style>
+        <p:txBody>
+          <a:bodyPr rtlCol="0" anchor="ctr"/>
+          <a:lstStyle/>
+          <a:p>
+            <a:pPr algn="r"/>
+            <a:r>
+              <a:rPr lang="en-IN" sz="1400" b="1" dirty="0">
+                <a:solidFill>
+                  <a:schemeClr val="accent1"/>
+                </a:solidFill>
+              </a:rPr>
+              <a:t>Send</a:t>
+            </a:r>
+          </a:p>
+        </p:txBody>
+      </p:sp>
+      <p:pic>
+        <p:nvPicPr>
+          <p:cNvPr id="14" name="Graphic 13" descr="Send with solid fill">
+            <a:extLst>
+              <a:ext uri="{FF2B5EF4-FFF2-40B4-BE49-F238E27FC236}">
+                <a16:creationId xmlns:a16="http://schemas.microsoft.com/office/drawing/2014/main" id="{76A4EE59-A771-4D5D-953E-10E38B26195B}"/>
+              </a:ext>
+            </a:extLst>
+          </p:cNvPr>
+          <p:cNvPicPr>
+            <a:picLocks noChangeAspect="1"/>
+          </p:cNvPicPr>
+          <p:nvPr/>
+        </p:nvPicPr>
+        <p:blipFill>
+          <a:blip r:embed="rId10">
+            <a:extLst>
+              <a:ext uri="{28A0092B-C50C-407E-A947-70E740481C1C}">
+                <a14:useLocalDpi xmlns:a14="http://schemas.microsoft.com/office/drawing/2010/main" val="0"/>
+              </a:ext>
+              <a:ext uri="{96DAC541-7B7A-43D3-8B79-37D633B846F1}">
+                <asvg:svgBlip xmlns:asvg="http://schemas.microsoft.com/office/drawing/2016/SVG/main" r:embed="rId11"/>
+              </a:ext>
+            </a:extLst>
+          </a:blip>
+          <a:stretch>
+            <a:fillRect/>
+          </a:stretch>
+        </p:blipFill>
+        <p:spPr>
+          <a:xfrm>
+            <a:off x="8877088" y="1040359"/>
+            <a:ext cx="273326" cy="265421"/>
+          </a:xfrm>
+          <a:prstGeom prst="rect">
+            <a:avLst/>
+          </a:prstGeom>
+        </p:spPr>
+      </p:pic>
+      <p:sp>
+        <p:nvSpPr>
+          <p:cNvPr id="47" name="Rectangle 46">
+            <a:extLst>
+              <a:ext uri="{FF2B5EF4-FFF2-40B4-BE49-F238E27FC236}">
+                <a16:creationId xmlns:a16="http://schemas.microsoft.com/office/drawing/2014/main" id="{AC90FB10-E314-45F5-9A60-C0F36BCDE363}"/>
+              </a:ext>
+            </a:extLst>
+          </p:cNvPr>
+          <p:cNvSpPr/>
+          <p:nvPr/>
+        </p:nvSpPr>
+        <p:spPr>
+          <a:xfrm>
+            <a:off x="3647883" y="699293"/>
+            <a:ext cx="2115671" cy="598753"/>
+          </a:xfrm>
+          <a:prstGeom prst="rect">
+            <a:avLst/>
+          </a:prstGeom>
+          <a:noFill/>
+          <a:ln>
+            <a:noFill/>
+          </a:ln>
+        </p:spPr>
+        <p:style>
+          <a:lnRef idx="2">
+            <a:schemeClr val="accent1">
+              <a:shade val="50000"/>
+            </a:schemeClr>
+          </a:lnRef>
+          <a:fillRef idx="1">
+            <a:schemeClr val="accent1"/>
+          </a:fillRef>
+          <a:effectRef idx="0">
+            <a:schemeClr val="accent1"/>
+          </a:effectRef>
+          <a:fontRef idx="minor">
+            <a:schemeClr val="lt1"/>
+          </a:fontRef>
+        </p:style>
+        <p:txBody>
+          <a:bodyPr rtlCol="0" anchor="ctr"/>
+          <a:lstStyle/>
+          <a:p>
+            <a:r>
+              <a:rPr lang="en-IN" sz="4000" dirty="0">
+                <a:solidFill>
+                  <a:schemeClr val="tx1">
+                    <a:lumMod val="65000"/>
+                    <a:lumOff val="35000"/>
+                  </a:schemeClr>
+                </a:solidFill>
+              </a:rPr>
+              <a:t>Home</a:t>
+            </a:r>
+          </a:p>
+        </p:txBody>
+      </p:sp>
+      <p:sp>
+        <p:nvSpPr>
+          <p:cNvPr id="28" name="Rectangle: Rounded Corners 27">
+            <a:extLst>
+              <a:ext uri="{FF2B5EF4-FFF2-40B4-BE49-F238E27FC236}">
+                <a16:creationId xmlns:a16="http://schemas.microsoft.com/office/drawing/2014/main" id="{30D84243-FFBD-458D-AE3F-342E016A6C9A}"/>
+              </a:ext>
+            </a:extLst>
+          </p:cNvPr>
+          <p:cNvSpPr/>
+          <p:nvPr/>
+        </p:nvSpPr>
+        <p:spPr>
+          <a:xfrm>
+            <a:off x="9757410" y="1040359"/>
+            <a:ext cx="986790" cy="273326"/>
+          </a:xfrm>
+          <a:prstGeom prst="roundRect">
+            <a:avLst/>
+          </a:prstGeom>
+          <a:solidFill>
+            <a:schemeClr val="bg1">
+              <a:lumMod val="95000"/>
+            </a:schemeClr>
+          </a:solidFill>
+          <a:ln>
+            <a:noFill/>
+          </a:ln>
+        </p:spPr>
+        <p:style>
+          <a:lnRef idx="2">
+            <a:schemeClr val="accent1">
+              <a:shade val="50000"/>
+            </a:schemeClr>
+          </a:lnRef>
+          <a:fillRef idx="1">
+            <a:schemeClr val="accent1"/>
+          </a:fillRef>
+          <a:effectRef idx="0">
+            <a:schemeClr val="accent1"/>
+          </a:effectRef>
+          <a:fontRef idx="minor">
+            <a:schemeClr val="lt1"/>
+          </a:fontRef>
+        </p:style>
+        <p:txBody>
+          <a:bodyPr rtlCol="0" anchor="ctr"/>
+          <a:lstStyle/>
+          <a:p>
+            <a:pPr algn="r"/>
+            <a:r>
+              <a:rPr lang="en-IN" sz="1400" b="1" dirty="0">
+                <a:solidFill>
+                  <a:schemeClr val="accent2"/>
+                </a:solidFill>
+              </a:rPr>
+              <a:t>Request</a:t>
+            </a:r>
+          </a:p>
+        </p:txBody>
+      </p:sp>
+      <p:pic>
+        <p:nvPicPr>
+          <p:cNvPr id="46" name="Graphic 45" descr="Back with solid fill">
+            <a:extLst>
+              <a:ext uri="{FF2B5EF4-FFF2-40B4-BE49-F238E27FC236}">
+                <a16:creationId xmlns:a16="http://schemas.microsoft.com/office/drawing/2014/main" id="{7A720AEE-6571-4B68-B385-7CBE345198EC}"/>
+              </a:ext>
+            </a:extLst>
+          </p:cNvPr>
+          <p:cNvPicPr>
+            <a:picLocks noChangeAspect="1"/>
+          </p:cNvPicPr>
+          <p:nvPr/>
+        </p:nvPicPr>
+        <p:blipFill>
+          <a:blip r:embed="rId12">
+            <a:extLst>
+              <a:ext uri="{28A0092B-C50C-407E-A947-70E740481C1C}">
+                <a14:useLocalDpi xmlns:a14="http://schemas.microsoft.com/office/drawing/2010/main" val="0"/>
+              </a:ext>
+              <a:ext uri="{96DAC541-7B7A-43D3-8B79-37D633B846F1}">
+                <asvg:svgBlip xmlns:asvg="http://schemas.microsoft.com/office/drawing/2016/SVG/main" r:embed="rId13"/>
+              </a:ext>
+            </a:extLst>
+          </a:blip>
+          <a:stretch>
+            <a:fillRect/>
+          </a:stretch>
+        </p:blipFill>
+        <p:spPr>
+          <a:xfrm>
+            <a:off x="9767340" y="1040359"/>
+            <a:ext cx="273326" cy="273326"/>
+          </a:xfrm>
+          <a:prstGeom prst="rect">
+            <a:avLst/>
+          </a:prstGeom>
+        </p:spPr>
+      </p:pic>
+      <p:sp>
+        <p:nvSpPr>
+          <p:cNvPr id="15" name="Rectangle 14">
+            <a:extLst>
+              <a:ext uri="{FF2B5EF4-FFF2-40B4-BE49-F238E27FC236}">
+                <a16:creationId xmlns:a16="http://schemas.microsoft.com/office/drawing/2014/main" id="{16F35A3B-0123-4D0C-9985-A20479A3B0E5}"/>
+              </a:ext>
+            </a:extLst>
+          </p:cNvPr>
+          <p:cNvSpPr/>
+          <p:nvPr/>
+        </p:nvSpPr>
+        <p:spPr>
+          <a:xfrm>
+            <a:off x="1684501" y="5960856"/>
+            <a:ext cx="948904" cy="340663"/>
+          </a:xfrm>
+          <a:prstGeom prst="rect">
+            <a:avLst/>
+          </a:prstGeom>
+          <a:noFill/>
+          <a:ln>
+            <a:noFill/>
+          </a:ln>
+        </p:spPr>
+        <p:style>
+          <a:lnRef idx="2">
+            <a:schemeClr val="accent1">
+              <a:shade val="50000"/>
+            </a:schemeClr>
+          </a:lnRef>
+          <a:fillRef idx="1">
+            <a:schemeClr val="accent1"/>
+          </a:fillRef>
+          <a:effectRef idx="0">
+            <a:schemeClr val="accent1"/>
+          </a:effectRef>
+          <a:fontRef idx="minor">
+            <a:schemeClr val="lt1"/>
+          </a:fontRef>
+        </p:style>
+        <p:txBody>
+          <a:bodyPr rtlCol="0" anchor="ctr"/>
+          <a:lstStyle/>
+          <a:p>
+            <a:pPr algn="ctr"/>
+            <a:r>
+              <a:rPr lang="en-IN" dirty="0">
+                <a:solidFill>
+                  <a:schemeClr val="bg2">
+                    <a:lumMod val="50000"/>
+                  </a:schemeClr>
+                </a:solidFill>
+              </a:rPr>
+              <a:t>Log Out</a:t>
+            </a:r>
+          </a:p>
+        </p:txBody>
+      </p:sp>
+      <p:pic>
+        <p:nvPicPr>
+          <p:cNvPr id="26" name="Graphic 25" descr="No sign with solid fill">
+            <a:extLst>
+              <a:ext uri="{FF2B5EF4-FFF2-40B4-BE49-F238E27FC236}">
+                <a16:creationId xmlns:a16="http://schemas.microsoft.com/office/drawing/2014/main" id="{9EBDCD0E-00A7-4347-A3A8-F4B1335C8DF1}"/>
+              </a:ext>
+            </a:extLst>
+          </p:cNvPr>
+          <p:cNvPicPr>
+            <a:picLocks noChangeAspect="1"/>
+          </p:cNvPicPr>
+          <p:nvPr/>
+        </p:nvPicPr>
+        <p:blipFill>
+          <a:blip r:embed="rId14">
+            <a:extLst>
+              <a:ext uri="{28A0092B-C50C-407E-A947-70E740481C1C}">
+                <a14:useLocalDpi xmlns:a14="http://schemas.microsoft.com/office/drawing/2010/main" val="0"/>
+              </a:ext>
+              <a:ext uri="{96DAC541-7B7A-43D3-8B79-37D633B846F1}">
+                <asvg:svgBlip xmlns:asvg="http://schemas.microsoft.com/office/drawing/2016/SVG/main" r:embed="rId15"/>
+              </a:ext>
+            </a:extLst>
+          </a:blip>
+          <a:stretch>
+            <a:fillRect/>
+          </a:stretch>
+        </p:blipFill>
+        <p:spPr>
+          <a:xfrm>
+            <a:off x="1463190" y="5957341"/>
+            <a:ext cx="340663" cy="340663"/>
           </a:xfrm>
           <a:prstGeom prst="rect">
             <a:avLst/>

</xml_diff>